<commit_message>
added dependencies and first project file
</commit_message>
<xml_diff>
--- a/slides/KinectDev.pptx
+++ b/slides/KinectDev.pptx
@@ -18,19 +18,20 @@
     <p:sldId id="279" r:id="rId12"/>
     <p:sldId id="282" r:id="rId13"/>
     <p:sldId id="267" r:id="rId14"/>
-    <p:sldId id="268" r:id="rId15"/>
-    <p:sldId id="277" r:id="rId16"/>
-    <p:sldId id="272" r:id="rId17"/>
-    <p:sldId id="270" r:id="rId18"/>
-    <p:sldId id="275" r:id="rId19"/>
-    <p:sldId id="269" r:id="rId20"/>
-    <p:sldId id="280" r:id="rId21"/>
-    <p:sldId id="281" r:id="rId22"/>
-    <p:sldId id="271" r:id="rId23"/>
-    <p:sldId id="276" r:id="rId24"/>
-    <p:sldId id="273" r:id="rId25"/>
-    <p:sldId id="278" r:id="rId26"/>
-    <p:sldId id="265" r:id="rId27"/>
+    <p:sldId id="283" r:id="rId15"/>
+    <p:sldId id="268" r:id="rId16"/>
+    <p:sldId id="277" r:id="rId17"/>
+    <p:sldId id="272" r:id="rId18"/>
+    <p:sldId id="270" r:id="rId19"/>
+    <p:sldId id="275" r:id="rId20"/>
+    <p:sldId id="269" r:id="rId21"/>
+    <p:sldId id="280" r:id="rId22"/>
+    <p:sldId id="281" r:id="rId23"/>
+    <p:sldId id="271" r:id="rId24"/>
+    <p:sldId id="276" r:id="rId25"/>
+    <p:sldId id="273" r:id="rId26"/>
+    <p:sldId id="278" r:id="rId27"/>
+    <p:sldId id="265" r:id="rId28"/>
   </p:sldIdLst>
   <p:sldSz cx="9144000" cy="5143500" type="screen16x9"/>
   <p:notesSz cx="6858000" cy="9144000"/>
@@ -4178,6 +4179,67 @@
             <p:ph type="title"/>
           </p:nvPr>
         </p:nvSpPr>
+        <p:spPr/>
+        <p:txBody>
+          <a:bodyPr/>
+          <a:lstStyle/>
+          <a:p>
+            <a:r>
+              <a:rPr lang="en-US" dirty="0" smtClean="0"/>
+              <a:t>Anatomy of a .NET </a:t>
+            </a:r>
+            <a:r>
+              <a:rPr lang="en-US" dirty="0" err="1" smtClean="0"/>
+              <a:t>Kinect</a:t>
+            </a:r>
+            <a:r>
+              <a:rPr lang="en-US" dirty="0" smtClean="0"/>
+              <a:t> Project</a:t>
+            </a:r>
+            <a:endParaRPr lang="en-US" dirty="0"/>
+          </a:p>
+        </p:txBody>
+      </p:sp>
+    </p:spTree>
+    <p:extLst>
+      <p:ext uri="{BB962C8B-B14F-4D97-AF65-F5344CB8AC3E}">
+        <p14:creationId xmlns:p14="http://schemas.microsoft.com/office/powerpoint/2010/main" val="3468459623"/>
+      </p:ext>
+    </p:extLst>
+  </p:cSld>
+  <p:clrMapOvr>
+    <a:masterClrMapping/>
+  </p:clrMapOvr>
+</p:sld>
+</file>
+
+<file path=ppt/slides/slide15.xml><?xml version="1.0" encoding="utf-8"?>
+<p:sld xmlns:a="http://schemas.openxmlformats.org/drawingml/2006/main" xmlns:r="http://schemas.openxmlformats.org/officeDocument/2006/relationships" xmlns:p="http://schemas.openxmlformats.org/presentationml/2006/main">
+  <p:cSld>
+    <p:spTree>
+      <p:nvGrpSpPr>
+        <p:cNvPr id="1" name=""/>
+        <p:cNvGrpSpPr/>
+        <p:nvPr/>
+      </p:nvGrpSpPr>
+      <p:grpSpPr>
+        <a:xfrm>
+          <a:off x="0" y="0"/>
+          <a:ext cx="0" cy="0"/>
+          <a:chOff x="0" y="0"/>
+          <a:chExt cx="0" cy="0"/>
+        </a:xfrm>
+      </p:grpSpPr>
+      <p:sp>
+        <p:nvSpPr>
+          <p:cNvPr id="2" name="Title 1"/>
+          <p:cNvSpPr>
+            <a:spLocks noGrp="1"/>
+          </p:cNvSpPr>
+          <p:nvPr>
+            <p:ph type="title"/>
+          </p:nvPr>
+        </p:nvSpPr>
         <p:spPr>
           <a:xfrm>
             <a:off x="4038600" y="1809750"/>
@@ -4255,7 +4317,7 @@
 </p:sld>
 </file>
 
-<file path=ppt/slides/slide15.xml><?xml version="1.0" encoding="utf-8"?>
+<file path=ppt/slides/slide16.xml><?xml version="1.0" encoding="utf-8"?>
 <p:sld xmlns:a="http://schemas.openxmlformats.org/drawingml/2006/main" xmlns:r="http://schemas.openxmlformats.org/officeDocument/2006/relationships" xmlns:p="http://schemas.openxmlformats.org/presentationml/2006/main">
   <p:cSld>
     <p:spTree>
@@ -4352,7 +4414,7 @@
 </p:sld>
 </file>
 
-<file path=ppt/slides/slide16.xml><?xml version="1.0" encoding="utf-8"?>
+<file path=ppt/slides/slide17.xml><?xml version="1.0" encoding="utf-8"?>
 <p:sld xmlns:a="http://schemas.openxmlformats.org/drawingml/2006/main" xmlns:r="http://schemas.openxmlformats.org/officeDocument/2006/relationships" xmlns:p="http://schemas.openxmlformats.org/presentationml/2006/main">
   <p:cSld>
     <p:spTree>
@@ -4468,117 +4530,6 @@
     <p:extLst>
       <p:ext uri="{BB962C8B-B14F-4D97-AF65-F5344CB8AC3E}">
         <p14:creationId xmlns:p14="http://schemas.microsoft.com/office/powerpoint/2010/main" val="2889536298"/>
-      </p:ext>
-    </p:extLst>
-  </p:cSld>
-  <p:clrMapOvr>
-    <a:masterClrMapping/>
-  </p:clrMapOvr>
-  <p:timing>
-    <p:tnLst>
-      <p:par>
-        <p:cTn id="1" dur="indefinite" restart="never" nodeType="tmRoot"/>
-      </p:par>
-    </p:tnLst>
-  </p:timing>
-</p:sld>
-</file>
-
-<file path=ppt/slides/slide17.xml><?xml version="1.0" encoding="utf-8"?>
-<p:sld xmlns:a="http://schemas.openxmlformats.org/drawingml/2006/main" xmlns:r="http://schemas.openxmlformats.org/officeDocument/2006/relationships" xmlns:p="http://schemas.openxmlformats.org/presentationml/2006/main">
-  <p:cSld>
-    <p:spTree>
-      <p:nvGrpSpPr>
-        <p:cNvPr id="1" name=""/>
-        <p:cNvGrpSpPr/>
-        <p:nvPr/>
-      </p:nvGrpSpPr>
-      <p:grpSpPr>
-        <a:xfrm>
-          <a:off x="0" y="0"/>
-          <a:ext cx="0" cy="0"/>
-          <a:chOff x="0" y="0"/>
-          <a:chExt cx="0" cy="0"/>
-        </a:xfrm>
-      </p:grpSpPr>
-      <p:pic>
-        <p:nvPicPr>
-          <p:cNvPr id="3" name="Picture 2"/>
-          <p:cNvPicPr>
-            <a:picLocks noChangeAspect="1"/>
-          </p:cNvPicPr>
-          <p:nvPr/>
-        </p:nvPicPr>
-        <p:blipFill>
-          <a:blip r:embed="rId2">
-            <a:extLst>
-              <a:ext uri="{28A0092B-C50C-407E-A947-70E740481C1C}">
-                <a14:useLocalDpi xmlns:a14="http://schemas.microsoft.com/office/drawing/2010/main" val="0"/>
-              </a:ext>
-            </a:extLst>
-          </a:blip>
-          <a:stretch>
-            <a:fillRect/>
-          </a:stretch>
-        </p:blipFill>
-        <p:spPr>
-          <a:xfrm>
-            <a:off x="0" y="0"/>
-            <a:ext cx="6858000" cy="5143500"/>
-          </a:xfrm>
-          <a:prstGeom prst="rect">
-            <a:avLst/>
-          </a:prstGeom>
-        </p:spPr>
-      </p:pic>
-      <p:sp>
-        <p:nvSpPr>
-          <p:cNvPr id="4" name="Title 3"/>
-          <p:cNvSpPr>
-            <a:spLocks noGrp="1"/>
-          </p:cNvSpPr>
-          <p:nvPr>
-            <p:ph type="title"/>
-          </p:nvPr>
-        </p:nvSpPr>
-        <p:spPr>
-          <a:xfrm>
-            <a:off x="7086600" y="1352550"/>
-            <a:ext cx="1828800" cy="1752600"/>
-          </a:xfrm>
-        </p:spPr>
-        <p:txBody>
-          <a:bodyPr>
-            <a:normAutofit fontScale="90000"/>
-          </a:bodyPr>
-          <a:lstStyle/>
-          <a:p>
-            <a:r>
-              <a:rPr lang="en-US" dirty="0" smtClean="0"/>
-              <a:t>Cursor control</a:t>
-            </a:r>
-            <a:br>
-              <a:rPr lang="en-US" dirty="0" smtClean="0"/>
-            </a:br>
-            <a:r>
-              <a:rPr lang="en-US" dirty="0" smtClean="0"/>
-              <a:t>with</a:t>
-            </a:r>
-            <a:br>
-              <a:rPr lang="en-US" dirty="0" smtClean="0"/>
-            </a:br>
-            <a:r>
-              <a:rPr lang="en-US" dirty="0" smtClean="0"/>
-              <a:t>NITE</a:t>
-            </a:r>
-            <a:endParaRPr lang="en-US" dirty="0"/>
-          </a:p>
-        </p:txBody>
-      </p:sp>
-    </p:spTree>
-    <p:extLst>
-      <p:ext uri="{BB962C8B-B14F-4D97-AF65-F5344CB8AC3E}">
-        <p14:creationId xmlns:p14="http://schemas.microsoft.com/office/powerpoint/2010/main" val="2908293680"/>
       </p:ext>
     </p:extLst>
   </p:cSld>
@@ -4634,8 +4585,8 @@
         </p:blipFill>
         <p:spPr>
           <a:xfrm>
-            <a:off x="-1752600" y="-57150"/>
-            <a:ext cx="6959600" cy="5219700"/>
+            <a:off x="0" y="0"/>
+            <a:ext cx="6858000" cy="5143500"/>
           </a:xfrm>
           <a:prstGeom prst="rect">
             <a:avLst/>
@@ -4644,7 +4595,7 @@
       </p:pic>
       <p:sp>
         <p:nvSpPr>
-          <p:cNvPr id="4" name="Title 1"/>
+          <p:cNvPr id="4" name="Title 3"/>
           <p:cNvSpPr>
             <a:spLocks noGrp="1"/>
           </p:cNvSpPr>
@@ -4654,8 +4605,8 @@
         </p:nvSpPr>
         <p:spPr>
           <a:xfrm>
-            <a:off x="5486400" y="1562100"/>
-            <a:ext cx="3429000" cy="1619250"/>
+            <a:off x="7086600" y="1352550"/>
+            <a:ext cx="1828800" cy="1752600"/>
           </a:xfrm>
         </p:spPr>
         <p:txBody>
@@ -4666,21 +4617,21 @@
           <a:p>
             <a:r>
               <a:rPr lang="en-US" dirty="0" smtClean="0"/>
-              <a:t>Cursor</a:t>
+              <a:t>Cursor control</a:t>
             </a:r>
             <a:br>
               <a:rPr lang="en-US" dirty="0" smtClean="0"/>
             </a:br>
             <a:r>
               <a:rPr lang="en-US" dirty="0" smtClean="0"/>
-              <a:t>Smoothing</a:t>
+              <a:t>with</a:t>
             </a:r>
             <a:br>
               <a:rPr lang="en-US" dirty="0" smtClean="0"/>
             </a:br>
             <a:r>
               <a:rPr lang="en-US" dirty="0" smtClean="0"/>
-              <a:t>(and scaling)</a:t>
+              <a:t>NITE</a:t>
             </a:r>
             <a:endParaRPr lang="en-US" dirty="0"/>
           </a:p>
@@ -4689,7 +4640,7 @@
     </p:spTree>
     <p:extLst>
       <p:ext uri="{BB962C8B-B14F-4D97-AF65-F5344CB8AC3E}">
-        <p14:creationId xmlns:p14="http://schemas.microsoft.com/office/powerpoint/2010/main" val="567761821"/>
+        <p14:creationId xmlns:p14="http://schemas.microsoft.com/office/powerpoint/2010/main" val="2908293680"/>
       </p:ext>
     </p:extLst>
   </p:cSld>
@@ -4707,167 +4658,6 @@
 </file>
 
 <file path=ppt/slides/slide19.xml><?xml version="1.0" encoding="utf-8"?>
-<p:sld xmlns:a="http://schemas.openxmlformats.org/drawingml/2006/main" xmlns:r="http://schemas.openxmlformats.org/officeDocument/2006/relationships" xmlns:p="http://schemas.openxmlformats.org/presentationml/2006/main">
-  <p:cSld>
-    <p:spTree>
-      <p:nvGrpSpPr>
-        <p:cNvPr id="1" name=""/>
-        <p:cNvGrpSpPr/>
-        <p:nvPr/>
-      </p:nvGrpSpPr>
-      <p:grpSpPr>
-        <a:xfrm>
-          <a:off x="0" y="0"/>
-          <a:ext cx="0" cy="0"/>
-          <a:chOff x="0" y="0"/>
-          <a:chExt cx="0" cy="0"/>
-        </a:xfrm>
-      </p:grpSpPr>
-      <p:sp>
-        <p:nvSpPr>
-          <p:cNvPr id="2" name="Title 1"/>
-          <p:cNvSpPr>
-            <a:spLocks noGrp="1"/>
-          </p:cNvSpPr>
-          <p:nvPr>
-            <p:ph type="title"/>
-          </p:nvPr>
-        </p:nvSpPr>
-        <p:spPr>
-          <a:xfrm>
-            <a:off x="4800600" y="1943100"/>
-            <a:ext cx="3886200" cy="857250"/>
-          </a:xfrm>
-        </p:spPr>
-        <p:txBody>
-          <a:bodyPr>
-            <a:normAutofit fontScale="90000"/>
-          </a:bodyPr>
-          <a:lstStyle/>
-          <a:p>
-            <a:r>
-              <a:rPr lang="en-US" dirty="0" smtClean="0"/>
-              <a:t>Swiping</a:t>
-            </a:r>
-            <a:br>
-              <a:rPr lang="en-US" dirty="0" smtClean="0"/>
-            </a:br>
-            <a:r>
-              <a:rPr lang="en-US" dirty="0" smtClean="0"/>
-              <a:t>(NITE)</a:t>
-            </a:r>
-            <a:endParaRPr lang="en-US" dirty="0"/>
-          </a:p>
-        </p:txBody>
-      </p:sp>
-      <p:pic>
-        <p:nvPicPr>
-          <p:cNvPr id="5" name="Picture 4"/>
-          <p:cNvPicPr>
-            <a:picLocks noChangeAspect="1"/>
-          </p:cNvPicPr>
-          <p:nvPr/>
-        </p:nvPicPr>
-        <p:blipFill>
-          <a:blip r:embed="rId2">
-            <a:extLst>
-              <a:ext uri="{28A0092B-C50C-407E-A947-70E740481C1C}">
-                <a14:useLocalDpi xmlns:a14="http://schemas.microsoft.com/office/drawing/2010/main" val="0"/>
-              </a:ext>
-            </a:extLst>
-          </a:blip>
-          <a:stretch>
-            <a:fillRect/>
-          </a:stretch>
-        </p:blipFill>
-        <p:spPr>
-          <a:xfrm>
-            <a:off x="-1" y="0"/>
-            <a:ext cx="4498041" cy="5143500"/>
-          </a:xfrm>
-          <a:prstGeom prst="rect">
-            <a:avLst/>
-          </a:prstGeom>
-        </p:spPr>
-      </p:pic>
-    </p:spTree>
-    <p:extLst>
-      <p:ext uri="{BB962C8B-B14F-4D97-AF65-F5344CB8AC3E}">
-        <p14:creationId xmlns:p14="http://schemas.microsoft.com/office/powerpoint/2010/main" val="3445804590"/>
-      </p:ext>
-    </p:extLst>
-  </p:cSld>
-  <p:clrMapOvr>
-    <a:masterClrMapping/>
-  </p:clrMapOvr>
-  <p:timing>
-    <p:tnLst>
-      <p:par>
-        <p:cTn id="1" dur="indefinite" restart="never" nodeType="tmRoot"/>
-      </p:par>
-    </p:tnLst>
-  </p:timing>
-</p:sld>
-</file>
-
-<file path=ppt/slides/slide2.xml><?xml version="1.0" encoding="utf-8"?>
-<p:sld xmlns:a="http://schemas.openxmlformats.org/drawingml/2006/main" xmlns:r="http://schemas.openxmlformats.org/officeDocument/2006/relationships" xmlns:p="http://schemas.openxmlformats.org/presentationml/2006/main">
-  <p:cSld>
-    <p:spTree>
-      <p:nvGrpSpPr>
-        <p:cNvPr id="1" name=""/>
-        <p:cNvGrpSpPr/>
-        <p:nvPr/>
-      </p:nvGrpSpPr>
-      <p:grpSpPr>
-        <a:xfrm>
-          <a:off x="0" y="0"/>
-          <a:ext cx="0" cy="0"/>
-          <a:chOff x="0" y="0"/>
-          <a:chExt cx="0" cy="0"/>
-        </a:xfrm>
-      </p:grpSpPr>
-      <p:sp>
-        <p:nvSpPr>
-          <p:cNvPr id="4" name="Title 3"/>
-          <p:cNvSpPr>
-            <a:spLocks noGrp="1"/>
-          </p:cNvSpPr>
-          <p:nvPr>
-            <p:ph type="title"/>
-          </p:nvPr>
-        </p:nvSpPr>
-        <p:spPr/>
-        <p:txBody>
-          <a:bodyPr/>
-          <a:lstStyle/>
-          <a:p>
-            <a:r>
-              <a:rPr lang="en-US" dirty="0" smtClean="0">
-                <a:latin typeface="+mn-lt"/>
-              </a:rPr>
-              <a:t>About the presenter</a:t>
-            </a:r>
-            <a:endParaRPr lang="en-US" dirty="0">
-              <a:latin typeface="+mn-lt"/>
-            </a:endParaRPr>
-          </a:p>
-        </p:txBody>
-      </p:sp>
-    </p:spTree>
-    <p:extLst>
-      <p:ext uri="{BB962C8B-B14F-4D97-AF65-F5344CB8AC3E}">
-        <p14:creationId xmlns:p14="http://schemas.microsoft.com/office/powerpoint/2010/main" val="1131898473"/>
-      </p:ext>
-    </p:extLst>
-  </p:cSld>
-  <p:clrMapOvr>
-    <a:masterClrMapping/>
-  </p:clrMapOvr>
-</p:sld>
-</file>
-
-<file path=ppt/slides/slide20.xml><?xml version="1.0" encoding="utf-8"?>
 <p:sld xmlns:a="http://schemas.openxmlformats.org/drawingml/2006/main" xmlns:r="http://schemas.openxmlformats.org/officeDocument/2006/relationships" xmlns:p="http://schemas.openxmlformats.org/presentationml/2006/main">
   <p:cSld>
     <p:spTree>
@@ -4906,8 +4696,8 @@
         </p:blipFill>
         <p:spPr>
           <a:xfrm>
-            <a:off x="6216805" y="0"/>
-            <a:ext cx="2927195" cy="5143500"/>
+            <a:off x="-1752600" y="-57150"/>
+            <a:ext cx="6959600" cy="5219700"/>
           </a:xfrm>
           <a:prstGeom prst="rect">
             <a:avLst/>
@@ -4926,8 +4716,8 @@
         </p:nvSpPr>
         <p:spPr>
           <a:xfrm>
-            <a:off x="1143000" y="2143125"/>
-            <a:ext cx="3886200" cy="857250"/>
+            <a:off x="5486400" y="1562100"/>
+            <a:ext cx="3429000" cy="1619250"/>
           </a:xfrm>
         </p:spPr>
         <p:txBody>
@@ -4938,22 +4728,21 @@
           <a:p>
             <a:r>
               <a:rPr lang="en-US" dirty="0" smtClean="0"/>
-              <a:t>User Skeletons</a:t>
+              <a:t>Cursor</a:t>
             </a:r>
             <a:br>
               <a:rPr lang="en-US" dirty="0" smtClean="0"/>
             </a:br>
             <a:r>
               <a:rPr lang="en-US" dirty="0" smtClean="0"/>
-              <a:t>(</a:t>
-            </a:r>
-            <a:r>
-              <a:rPr lang="en-US" dirty="0" err="1" smtClean="0"/>
-              <a:t>OpenNI</a:t>
-            </a:r>
-            <a:r>
+              <a:t>Smoothing</a:t>
+            </a:r>
+            <a:br>
               <a:rPr lang="en-US" dirty="0" smtClean="0"/>
-              <a:t>)</a:t>
+            </a:br>
+            <a:r>
+              <a:rPr lang="en-US" dirty="0" smtClean="0"/>
+              <a:t>(and scaling)</a:t>
             </a:r>
             <a:endParaRPr lang="en-US" dirty="0"/>
           </a:p>
@@ -4962,7 +4751,168 @@
     </p:spTree>
     <p:extLst>
       <p:ext uri="{BB962C8B-B14F-4D97-AF65-F5344CB8AC3E}">
-        <p14:creationId xmlns:p14="http://schemas.microsoft.com/office/powerpoint/2010/main" val="3307906043"/>
+        <p14:creationId xmlns:p14="http://schemas.microsoft.com/office/powerpoint/2010/main" val="567761821"/>
+      </p:ext>
+    </p:extLst>
+  </p:cSld>
+  <p:clrMapOvr>
+    <a:masterClrMapping/>
+  </p:clrMapOvr>
+  <p:timing>
+    <p:tnLst>
+      <p:par>
+        <p:cTn id="1" dur="indefinite" restart="never" nodeType="tmRoot"/>
+      </p:par>
+    </p:tnLst>
+  </p:timing>
+</p:sld>
+</file>
+
+<file path=ppt/slides/slide2.xml><?xml version="1.0" encoding="utf-8"?>
+<p:sld xmlns:a="http://schemas.openxmlformats.org/drawingml/2006/main" xmlns:r="http://schemas.openxmlformats.org/officeDocument/2006/relationships" xmlns:p="http://schemas.openxmlformats.org/presentationml/2006/main">
+  <p:cSld>
+    <p:spTree>
+      <p:nvGrpSpPr>
+        <p:cNvPr id="1" name=""/>
+        <p:cNvGrpSpPr/>
+        <p:nvPr/>
+      </p:nvGrpSpPr>
+      <p:grpSpPr>
+        <a:xfrm>
+          <a:off x="0" y="0"/>
+          <a:ext cx="0" cy="0"/>
+          <a:chOff x="0" y="0"/>
+          <a:chExt cx="0" cy="0"/>
+        </a:xfrm>
+      </p:grpSpPr>
+      <p:sp>
+        <p:nvSpPr>
+          <p:cNvPr id="4" name="Title 3"/>
+          <p:cNvSpPr>
+            <a:spLocks noGrp="1"/>
+          </p:cNvSpPr>
+          <p:nvPr>
+            <p:ph type="title"/>
+          </p:nvPr>
+        </p:nvSpPr>
+        <p:spPr/>
+        <p:txBody>
+          <a:bodyPr/>
+          <a:lstStyle/>
+          <a:p>
+            <a:r>
+              <a:rPr lang="en-US" dirty="0" smtClean="0">
+                <a:latin typeface="+mn-lt"/>
+              </a:rPr>
+              <a:t>About the presenter</a:t>
+            </a:r>
+            <a:endParaRPr lang="en-US" dirty="0">
+              <a:latin typeface="+mn-lt"/>
+            </a:endParaRPr>
+          </a:p>
+        </p:txBody>
+      </p:sp>
+    </p:spTree>
+    <p:extLst>
+      <p:ext uri="{BB962C8B-B14F-4D97-AF65-F5344CB8AC3E}">
+        <p14:creationId xmlns:p14="http://schemas.microsoft.com/office/powerpoint/2010/main" val="1131898473"/>
+      </p:ext>
+    </p:extLst>
+  </p:cSld>
+  <p:clrMapOvr>
+    <a:masterClrMapping/>
+  </p:clrMapOvr>
+</p:sld>
+</file>
+
+<file path=ppt/slides/slide20.xml><?xml version="1.0" encoding="utf-8"?>
+<p:sld xmlns:a="http://schemas.openxmlformats.org/drawingml/2006/main" xmlns:r="http://schemas.openxmlformats.org/officeDocument/2006/relationships" xmlns:p="http://schemas.openxmlformats.org/presentationml/2006/main">
+  <p:cSld>
+    <p:spTree>
+      <p:nvGrpSpPr>
+        <p:cNvPr id="1" name=""/>
+        <p:cNvGrpSpPr/>
+        <p:nvPr/>
+      </p:nvGrpSpPr>
+      <p:grpSpPr>
+        <a:xfrm>
+          <a:off x="0" y="0"/>
+          <a:ext cx="0" cy="0"/>
+          <a:chOff x="0" y="0"/>
+          <a:chExt cx="0" cy="0"/>
+        </a:xfrm>
+      </p:grpSpPr>
+      <p:sp>
+        <p:nvSpPr>
+          <p:cNvPr id="2" name="Title 1"/>
+          <p:cNvSpPr>
+            <a:spLocks noGrp="1"/>
+          </p:cNvSpPr>
+          <p:nvPr>
+            <p:ph type="title"/>
+          </p:nvPr>
+        </p:nvSpPr>
+        <p:spPr>
+          <a:xfrm>
+            <a:off x="4800600" y="1943100"/>
+            <a:ext cx="3886200" cy="857250"/>
+          </a:xfrm>
+        </p:spPr>
+        <p:txBody>
+          <a:bodyPr>
+            <a:normAutofit fontScale="90000"/>
+          </a:bodyPr>
+          <a:lstStyle/>
+          <a:p>
+            <a:r>
+              <a:rPr lang="en-US" dirty="0" smtClean="0"/>
+              <a:t>Swiping</a:t>
+            </a:r>
+            <a:br>
+              <a:rPr lang="en-US" dirty="0" smtClean="0"/>
+            </a:br>
+            <a:r>
+              <a:rPr lang="en-US" dirty="0" smtClean="0"/>
+              <a:t>(NITE)</a:t>
+            </a:r>
+            <a:endParaRPr lang="en-US" dirty="0"/>
+          </a:p>
+        </p:txBody>
+      </p:sp>
+      <p:pic>
+        <p:nvPicPr>
+          <p:cNvPr id="5" name="Picture 4"/>
+          <p:cNvPicPr>
+            <a:picLocks noChangeAspect="1"/>
+          </p:cNvPicPr>
+          <p:nvPr/>
+        </p:nvPicPr>
+        <p:blipFill>
+          <a:blip r:embed="rId2">
+            <a:extLst>
+              <a:ext uri="{28A0092B-C50C-407E-A947-70E740481C1C}">
+                <a14:useLocalDpi xmlns:a14="http://schemas.microsoft.com/office/drawing/2010/main" val="0"/>
+              </a:ext>
+            </a:extLst>
+          </a:blip>
+          <a:stretch>
+            <a:fillRect/>
+          </a:stretch>
+        </p:blipFill>
+        <p:spPr>
+          <a:xfrm>
+            <a:off x="-1" y="0"/>
+            <a:ext cx="4498041" cy="5143500"/>
+          </a:xfrm>
+          <a:prstGeom prst="rect">
+            <a:avLst/>
+          </a:prstGeom>
+        </p:spPr>
+      </p:pic>
+    </p:spTree>
+    <p:extLst>
+      <p:ext uri="{BB962C8B-B14F-4D97-AF65-F5344CB8AC3E}">
+        <p14:creationId xmlns:p14="http://schemas.microsoft.com/office/powerpoint/2010/main" val="3445804590"/>
       </p:ext>
     </p:extLst>
   </p:cSld>
@@ -4996,9 +4946,39 @@
           <a:chExt cx="0" cy="0"/>
         </a:xfrm>
       </p:grpSpPr>
-      <p:sp>
-        <p:nvSpPr>
-          <p:cNvPr id="2" name="Title 1"/>
+      <p:pic>
+        <p:nvPicPr>
+          <p:cNvPr id="3" name="Picture 2"/>
+          <p:cNvPicPr>
+            <a:picLocks noChangeAspect="1"/>
+          </p:cNvPicPr>
+          <p:nvPr/>
+        </p:nvPicPr>
+        <p:blipFill>
+          <a:blip r:embed="rId2">
+            <a:extLst>
+              <a:ext uri="{28A0092B-C50C-407E-A947-70E740481C1C}">
+                <a14:useLocalDpi xmlns:a14="http://schemas.microsoft.com/office/drawing/2010/main" val="0"/>
+              </a:ext>
+            </a:extLst>
+          </a:blip>
+          <a:stretch>
+            <a:fillRect/>
+          </a:stretch>
+        </p:blipFill>
+        <p:spPr>
+          <a:xfrm>
+            <a:off x="6216805" y="0"/>
+            <a:ext cx="2927195" cy="5143500"/>
+          </a:xfrm>
+          <a:prstGeom prst="rect">
+            <a:avLst/>
+          </a:prstGeom>
+        </p:spPr>
+      </p:pic>
+      <p:sp>
+        <p:nvSpPr>
+          <p:cNvPr id="4" name="Title 1"/>
           <p:cNvSpPr>
             <a:spLocks noGrp="1"/>
           </p:cNvSpPr>
@@ -5006,25 +4986,58 @@
             <p:ph type="title"/>
           </p:nvPr>
         </p:nvSpPr>
-        <p:spPr/>
-        <p:txBody>
-          <a:bodyPr/>
-          <a:lstStyle/>
-          <a:p>
-            <a:endParaRPr lang="en-US"/>
+        <p:spPr>
+          <a:xfrm>
+            <a:off x="1143000" y="2143125"/>
+            <a:ext cx="3886200" cy="857250"/>
+          </a:xfrm>
+        </p:spPr>
+        <p:txBody>
+          <a:bodyPr>
+            <a:normAutofit fontScale="90000"/>
+          </a:bodyPr>
+          <a:lstStyle/>
+          <a:p>
+            <a:r>
+              <a:rPr lang="en-US" dirty="0" smtClean="0"/>
+              <a:t>User Skeletons</a:t>
+            </a:r>
+            <a:br>
+              <a:rPr lang="en-US" dirty="0" smtClean="0"/>
+            </a:br>
+            <a:r>
+              <a:rPr lang="en-US" dirty="0" smtClean="0"/>
+              <a:t>(</a:t>
+            </a:r>
+            <a:r>
+              <a:rPr lang="en-US" dirty="0" err="1" smtClean="0"/>
+              <a:t>OpenNI</a:t>
+            </a:r>
+            <a:r>
+              <a:rPr lang="en-US" dirty="0" smtClean="0"/>
+              <a:t>)</a:t>
+            </a:r>
+            <a:endParaRPr lang="en-US" dirty="0"/>
           </a:p>
         </p:txBody>
       </p:sp>
     </p:spTree>
     <p:extLst>
       <p:ext uri="{BB962C8B-B14F-4D97-AF65-F5344CB8AC3E}">
-        <p14:creationId xmlns:p14="http://schemas.microsoft.com/office/powerpoint/2010/main" val="2802289633"/>
+        <p14:creationId xmlns:p14="http://schemas.microsoft.com/office/powerpoint/2010/main" val="3307906043"/>
       </p:ext>
     </p:extLst>
   </p:cSld>
   <p:clrMapOvr>
     <a:masterClrMapping/>
   </p:clrMapOvr>
+  <p:timing>
+    <p:tnLst>
+      <p:par>
+        <p:cTn id="1" dur="indefinite" restart="never" nodeType="tmRoot"/>
+      </p:par>
+    </p:tnLst>
+  </p:timing>
 </p:sld>
 </file>
 
@@ -5057,6 +5070,55 @@
         </p:nvSpPr>
         <p:spPr/>
         <p:txBody>
+          <a:bodyPr/>
+          <a:lstStyle/>
+          <a:p>
+            <a:endParaRPr lang="en-US"/>
+          </a:p>
+        </p:txBody>
+      </p:sp>
+    </p:spTree>
+    <p:extLst>
+      <p:ext uri="{BB962C8B-B14F-4D97-AF65-F5344CB8AC3E}">
+        <p14:creationId xmlns:p14="http://schemas.microsoft.com/office/powerpoint/2010/main" val="2802289633"/>
+      </p:ext>
+    </p:extLst>
+  </p:cSld>
+  <p:clrMapOvr>
+    <a:masterClrMapping/>
+  </p:clrMapOvr>
+</p:sld>
+</file>
+
+<file path=ppt/slides/slide23.xml><?xml version="1.0" encoding="utf-8"?>
+<p:sld xmlns:a="http://schemas.openxmlformats.org/drawingml/2006/main" xmlns:r="http://schemas.openxmlformats.org/officeDocument/2006/relationships" xmlns:p="http://schemas.openxmlformats.org/presentationml/2006/main">
+  <p:cSld>
+    <p:spTree>
+      <p:nvGrpSpPr>
+        <p:cNvPr id="1" name=""/>
+        <p:cNvGrpSpPr/>
+        <p:nvPr/>
+      </p:nvGrpSpPr>
+      <p:grpSpPr>
+        <a:xfrm>
+          <a:off x="0" y="0"/>
+          <a:ext cx="0" cy="0"/>
+          <a:chOff x="0" y="0"/>
+          <a:chExt cx="0" cy="0"/>
+        </a:xfrm>
+      </p:grpSpPr>
+      <p:sp>
+        <p:nvSpPr>
+          <p:cNvPr id="2" name="Title 1"/>
+          <p:cNvSpPr>
+            <a:spLocks noGrp="1"/>
+          </p:cNvSpPr>
+          <p:nvPr>
+            <p:ph type="title"/>
+          </p:nvPr>
+        </p:nvSpPr>
+        <p:spPr/>
+        <p:txBody>
           <a:bodyPr>
             <a:normAutofit fontScale="90000"/>
           </a:bodyPr>
@@ -5097,7 +5159,7 @@
 </p:sld>
 </file>
 
-<file path=ppt/slides/slide23.xml><?xml version="1.0" encoding="utf-8"?>
+<file path=ppt/slides/slide24.xml><?xml version="1.0" encoding="utf-8"?>
 <p:sld xmlns:a="http://schemas.openxmlformats.org/drawingml/2006/main" xmlns:r="http://schemas.openxmlformats.org/officeDocument/2006/relationships" xmlns:p="http://schemas.openxmlformats.org/presentationml/2006/main">
   <p:cSld>
     <p:spTree>
@@ -5192,7 +5254,7 @@
 </p:sld>
 </file>
 
-<file path=ppt/slides/slide24.xml><?xml version="1.0" encoding="utf-8"?>
+<file path=ppt/slides/slide25.xml><?xml version="1.0" encoding="utf-8"?>
 <p:sld xmlns:a="http://schemas.openxmlformats.org/drawingml/2006/main" xmlns:r="http://schemas.openxmlformats.org/officeDocument/2006/relationships" xmlns:p="http://schemas.openxmlformats.org/presentationml/2006/main">
   <p:cSld>
     <p:bg>
@@ -5354,7 +5416,7 @@
 </p:sld>
 </file>
 
-<file path=ppt/slides/slide25.xml><?xml version="1.0" encoding="utf-8"?>
+<file path=ppt/slides/slide26.xml><?xml version="1.0" encoding="utf-8"?>
 <p:sld xmlns:a="http://schemas.openxmlformats.org/drawingml/2006/main" xmlns:r="http://schemas.openxmlformats.org/officeDocument/2006/relationships" xmlns:p="http://schemas.openxmlformats.org/presentationml/2006/main">
   <p:cSld>
     <p:spTree>
@@ -5444,7 +5506,7 @@
 </p:sld>
 </file>
 
-<file path=ppt/slides/slide26.xml><?xml version="1.0" encoding="utf-8"?>
+<file path=ppt/slides/slide27.xml><?xml version="1.0" encoding="utf-8"?>
 <p:sld xmlns:a="http://schemas.openxmlformats.org/drawingml/2006/main" xmlns:r="http://schemas.openxmlformats.org/officeDocument/2006/relationships" xmlns:p="http://schemas.openxmlformats.org/presentationml/2006/main">
   <p:cSld>
     <p:spTree>

</xml_diff>

<commit_message>
finalized usertracker and added swipe demo
</commit_message>
<xml_diff>
--- a/slides/KinectDev.pptx
+++ b/slides/KinectDev.pptx
@@ -30,9 +30,10 @@
     <p:sldId id="275" r:id="rId24"/>
     <p:sldId id="269" r:id="rId25"/>
     <p:sldId id="280" r:id="rId26"/>
-    <p:sldId id="276" r:id="rId27"/>
-    <p:sldId id="273" r:id="rId28"/>
-    <p:sldId id="265" r:id="rId29"/>
+    <p:sldId id="288" r:id="rId27"/>
+    <p:sldId id="276" r:id="rId28"/>
+    <p:sldId id="273" r:id="rId29"/>
+    <p:sldId id="265" r:id="rId30"/>
   </p:sldIdLst>
   <p:sldSz cx="9144000" cy="5143500" type="screen16x9"/>
   <p:notesSz cx="6858000" cy="9144000"/>
@@ -5397,6 +5398,110 @@
           <a:chExt cx="0" cy="0"/>
         </a:xfrm>
       </p:grpSpPr>
+      <p:sp>
+        <p:nvSpPr>
+          <p:cNvPr id="2" name="Title 1"/>
+          <p:cNvSpPr>
+            <a:spLocks noGrp="1"/>
+          </p:cNvSpPr>
+          <p:nvPr>
+            <p:ph type="title"/>
+          </p:nvPr>
+        </p:nvSpPr>
+        <p:spPr>
+          <a:xfrm>
+            <a:off x="4498040" y="1943100"/>
+            <a:ext cx="4645960" cy="857250"/>
+          </a:xfrm>
+        </p:spPr>
+        <p:txBody>
+          <a:bodyPr>
+            <a:normAutofit fontScale="90000"/>
+          </a:bodyPr>
+          <a:lstStyle/>
+          <a:p>
+            <a:r>
+              <a:rPr lang="en-US" dirty="0" smtClean="0"/>
+              <a:t>Alternative Swiping </a:t>
+            </a:r>
+            <a:br>
+              <a:rPr lang="en-US" dirty="0" smtClean="0"/>
+            </a:br>
+            <a:r>
+              <a:rPr lang="en-US" dirty="0" smtClean="0"/>
+              <a:t>(and other filtering)</a:t>
+            </a:r>
+            <a:endParaRPr lang="en-US" dirty="0"/>
+          </a:p>
+        </p:txBody>
+      </p:sp>
+      <p:pic>
+        <p:nvPicPr>
+          <p:cNvPr id="5" name="Picture 4"/>
+          <p:cNvPicPr>
+            <a:picLocks noChangeAspect="1"/>
+          </p:cNvPicPr>
+          <p:nvPr/>
+        </p:nvPicPr>
+        <p:blipFill>
+          <a:blip r:embed="rId2">
+            <a:extLst>
+              <a:ext uri="{28A0092B-C50C-407E-A947-70E740481C1C}">
+                <a14:useLocalDpi xmlns:a14="http://schemas.microsoft.com/office/drawing/2010/main" val="0"/>
+              </a:ext>
+            </a:extLst>
+          </a:blip>
+          <a:stretch>
+            <a:fillRect/>
+          </a:stretch>
+        </p:blipFill>
+        <p:spPr>
+          <a:xfrm>
+            <a:off x="-1" y="0"/>
+            <a:ext cx="4498041" cy="5143500"/>
+          </a:xfrm>
+          <a:prstGeom prst="rect">
+            <a:avLst/>
+          </a:prstGeom>
+        </p:spPr>
+      </p:pic>
+    </p:spTree>
+    <p:extLst>
+      <p:ext uri="{BB962C8B-B14F-4D97-AF65-F5344CB8AC3E}">
+        <p14:creationId xmlns:p14="http://schemas.microsoft.com/office/powerpoint/2010/main" val="3715300583"/>
+      </p:ext>
+    </p:extLst>
+  </p:cSld>
+  <p:clrMapOvr>
+    <a:masterClrMapping/>
+  </p:clrMapOvr>
+  <p:timing>
+    <p:tnLst>
+      <p:par>
+        <p:cTn id="1" dur="indefinite" restart="never" nodeType="tmRoot"/>
+      </p:par>
+    </p:tnLst>
+  </p:timing>
+</p:sld>
+</file>
+
+<file path=ppt/slides/slide27.xml><?xml version="1.0" encoding="utf-8"?>
+<p:sld xmlns:a="http://schemas.openxmlformats.org/drawingml/2006/main" xmlns:r="http://schemas.openxmlformats.org/officeDocument/2006/relationships" xmlns:p="http://schemas.openxmlformats.org/presentationml/2006/main">
+  <p:cSld>
+    <p:spTree>
+      <p:nvGrpSpPr>
+        <p:cNvPr id="1" name=""/>
+        <p:cNvGrpSpPr/>
+        <p:nvPr/>
+      </p:nvGrpSpPr>
+      <p:grpSpPr>
+        <a:xfrm>
+          <a:off x="0" y="0"/>
+          <a:ext cx="0" cy="0"/>
+          <a:chOff x="0" y="0"/>
+          <a:chExt cx="0" cy="0"/>
+        </a:xfrm>
+      </p:grpSpPr>
       <p:pic>
         <p:nvPicPr>
           <p:cNvPr id="4" name="Picture 3"/>
@@ -5475,7 +5580,7 @@
 </p:sld>
 </file>
 
-<file path=ppt/slides/slide27.xml><?xml version="1.0" encoding="utf-8"?>
+<file path=ppt/slides/slide28.xml><?xml version="1.0" encoding="utf-8"?>
 <p:sld xmlns:a="http://schemas.openxmlformats.org/drawingml/2006/main" xmlns:r="http://schemas.openxmlformats.org/officeDocument/2006/relationships" xmlns:p="http://schemas.openxmlformats.org/presentationml/2006/main">
   <p:cSld>
     <p:bg>
@@ -5637,7 +5742,7 @@
 </p:sld>
 </file>
 
-<file path=ppt/slides/slide28.xml><?xml version="1.0" encoding="utf-8"?>
+<file path=ppt/slides/slide29.xml><?xml version="1.0" encoding="utf-8"?>
 <p:sld xmlns:a="http://schemas.openxmlformats.org/drawingml/2006/main" xmlns:r="http://schemas.openxmlformats.org/officeDocument/2006/relationships" xmlns:p="http://schemas.openxmlformats.org/presentationml/2006/main">
   <p:cSld>
     <p:spTree>

</xml_diff>